<commit_message>
Fixed the incorrect chevron
</commit_message>
<xml_diff>
--- a/atlas/AppendixCharts.pptx
+++ b/atlas/AppendixCharts.pptx
@@ -152,7 +152,7 @@
   </p:defaultTextStyle>
   <p:extLst>
     <p:ext uri="{EFAFB233-063F-42B5-8137-9DF3F51BA10A}">
-      <p15:sldGuideLst xmlns:p15="http://schemas.microsoft.com/office/powerpoint/2012/main">
+      <p15:sldGuideLst xmlns:p15="http://schemas.microsoft.com/office/powerpoint/2012/main" xmlns="">
         <p15:guide id="1" orient="horz" pos="4001">
           <p15:clr>
             <a:srgbClr val="A4A3A4"/>
@@ -171,7 +171,7 @@
       </p15:sldGuideLst>
     </p:ext>
     <p:ext uri="{2D200454-40CA-4A62-9FC3-DE9A4176ACB9}">
-      <p15:notesGuideLst xmlns:p15="http://schemas.microsoft.com/office/powerpoint/2012/main">
+      <p15:notesGuideLst xmlns:p15="http://schemas.microsoft.com/office/powerpoint/2012/main" xmlns="">
         <p15:guide id="1" orient="horz" pos="3131">
           <p15:clr>
             <a:srgbClr val="A4A3A4"/>
@@ -191,7 +191,7 @@
 <file path=ppt/charts/chart1.xml><?xml version="1.0" encoding="utf-8"?>
 <c:chartSpace xmlns:c="http://schemas.openxmlformats.org/drawingml/2006/chart" xmlns:a="http://schemas.openxmlformats.org/drawingml/2006/main" xmlns:r="http://schemas.openxmlformats.org/officeDocument/2006/relationships">
   <c:date1904 val="0"/>
-  <c:lang val="en-US"/>
+  <c:lang val="en-AU"/>
   <c:roundedCorners val="0"/>
   <mc:AlternateContent xmlns:mc="http://schemas.openxmlformats.org/markup-compatibility/2006">
     <mc:Choice xmlns:c14="http://schemas.microsoft.com/office/drawing/2007/8/2/chart" Requires="c14">
@@ -334,11 +334,11 @@
           <c:showPercent val="0"/>
           <c:showBubbleSize val="0"/>
         </c:dLbls>
-        <c:axId val="477941648"/>
-        <c:axId val="477937728"/>
+        <c:axId val="115807744"/>
+        <c:axId val="34279424"/>
       </c:areaChart>
       <c:catAx>
-        <c:axId val="477941648"/>
+        <c:axId val="115807744"/>
         <c:scaling>
           <c:orientation val="minMax"/>
         </c:scaling>
@@ -348,7 +348,7 @@
         <c:majorTickMark val="out"/>
         <c:minorTickMark val="none"/>
         <c:tickLblPos val="nextTo"/>
-        <c:crossAx val="477937728"/>
+        <c:crossAx val="34279424"/>
         <c:crosses val="autoZero"/>
         <c:auto val="1"/>
         <c:lblAlgn val="ctr"/>
@@ -356,7 +356,7 @@
         <c:noMultiLvlLbl val="0"/>
       </c:catAx>
       <c:valAx>
-        <c:axId val="477937728"/>
+        <c:axId val="34279424"/>
         <c:scaling>
           <c:orientation val="minMax"/>
           <c:max val="100"/>
@@ -394,7 +394,7 @@
             <a:endParaRPr lang="en-US"/>
           </a:p>
         </c:txPr>
-        <c:crossAx val="477941648"/>
+        <c:crossAx val="115807744"/>
         <c:crosses val="autoZero"/>
         <c:crossBetween val="midCat"/>
         <c:majorUnit val="25"/>
@@ -423,7 +423,7 @@
 <file path=ppt/charts/chart2.xml><?xml version="1.0" encoding="utf-8"?>
 <c:chartSpace xmlns:c="http://schemas.openxmlformats.org/drawingml/2006/chart" xmlns:a="http://schemas.openxmlformats.org/drawingml/2006/main" xmlns:r="http://schemas.openxmlformats.org/officeDocument/2006/relationships">
   <c:date1904 val="0"/>
-  <c:lang val="en-US"/>
+  <c:lang val="en-AU"/>
   <c:roundedCorners val="0"/>
   <mc:AlternateContent xmlns:mc="http://schemas.openxmlformats.org/markup-compatibility/2006">
     <mc:Choice xmlns:c14="http://schemas.microsoft.com/office/drawing/2007/8/2/chart" Requires="c14">
@@ -536,11 +536,11 @@
           <c:showPercent val="0"/>
           <c:showBubbleSize val="0"/>
         </c:dLbls>
-        <c:axId val="477936944"/>
-        <c:axId val="477936552"/>
+        <c:axId val="34167040"/>
+        <c:axId val="34177024"/>
       </c:areaChart>
       <c:catAx>
-        <c:axId val="477936944"/>
+        <c:axId val="34167040"/>
         <c:scaling>
           <c:orientation val="minMax"/>
         </c:scaling>
@@ -550,7 +550,7 @@
         <c:majorTickMark val="out"/>
         <c:minorTickMark val="none"/>
         <c:tickLblPos val="nextTo"/>
-        <c:crossAx val="477936552"/>
+        <c:crossAx val="34177024"/>
         <c:crosses val="autoZero"/>
         <c:auto val="1"/>
         <c:lblAlgn val="ctr"/>
@@ -558,7 +558,7 @@
         <c:noMultiLvlLbl val="0"/>
       </c:catAx>
       <c:valAx>
-        <c:axId val="477936552"/>
+        <c:axId val="34177024"/>
         <c:scaling>
           <c:orientation val="minMax"/>
           <c:max val="100"/>
@@ -600,7 +600,7 @@
             <a:endParaRPr lang="en-US"/>
           </a:p>
         </c:txPr>
-        <c:crossAx val="477936944"/>
+        <c:crossAx val="34167040"/>
         <c:crosses val="autoZero"/>
         <c:crossBetween val="midCat"/>
         <c:majorUnit val="25"/>
@@ -629,7 +629,7 @@
 <file path=ppt/charts/chart3.xml><?xml version="1.0" encoding="utf-8"?>
 <c:chartSpace xmlns:c="http://schemas.openxmlformats.org/drawingml/2006/chart" xmlns:a="http://schemas.openxmlformats.org/drawingml/2006/main" xmlns:r="http://schemas.openxmlformats.org/officeDocument/2006/relationships">
   <c:date1904 val="0"/>
-  <c:lang val="en-US"/>
+  <c:lang val="en-AU"/>
   <c:roundedCorners val="0"/>
   <mc:AlternateContent xmlns:mc="http://schemas.openxmlformats.org/markup-compatibility/2006">
     <mc:Choice xmlns:c14="http://schemas.microsoft.com/office/drawing/2007/8/2/chart" Requires="c14">
@@ -742,11 +742,11 @@
           <c:showPercent val="0"/>
           <c:showBubbleSize val="0"/>
         </c:dLbls>
-        <c:axId val="477938512"/>
-        <c:axId val="477942432"/>
+        <c:axId val="34221056"/>
+        <c:axId val="34222848"/>
       </c:areaChart>
       <c:catAx>
-        <c:axId val="477938512"/>
+        <c:axId val="34221056"/>
         <c:scaling>
           <c:orientation val="minMax"/>
         </c:scaling>
@@ -756,7 +756,7 @@
         <c:majorTickMark val="out"/>
         <c:minorTickMark val="none"/>
         <c:tickLblPos val="nextTo"/>
-        <c:crossAx val="477942432"/>
+        <c:crossAx val="34222848"/>
         <c:crosses val="autoZero"/>
         <c:auto val="1"/>
         <c:lblAlgn val="ctr"/>
@@ -764,7 +764,7 @@
         <c:noMultiLvlLbl val="0"/>
       </c:catAx>
       <c:valAx>
-        <c:axId val="477942432"/>
+        <c:axId val="34222848"/>
         <c:scaling>
           <c:orientation val="minMax"/>
           <c:max val="100"/>
@@ -802,7 +802,7 @@
             <a:endParaRPr lang="en-US"/>
           </a:p>
         </c:txPr>
-        <c:crossAx val="477938512"/>
+        <c:crossAx val="34221056"/>
         <c:crosses val="autoZero"/>
         <c:crossBetween val="midCat"/>
         <c:majorUnit val="25"/>
@@ -831,7 +831,7 @@
 <file path=ppt/charts/chart4.xml><?xml version="1.0" encoding="utf-8"?>
 <c:chartSpace xmlns:c="http://schemas.openxmlformats.org/drawingml/2006/chart" xmlns:a="http://schemas.openxmlformats.org/drawingml/2006/main" xmlns:r="http://schemas.openxmlformats.org/officeDocument/2006/relationships">
   <c:date1904 val="0"/>
-  <c:lang val="en-US"/>
+  <c:lang val="en-AU"/>
   <c:roundedCorners val="0"/>
   <mc:AlternateContent xmlns:mc="http://schemas.openxmlformats.org/markup-compatibility/2006">
     <mc:Choice xmlns:c14="http://schemas.microsoft.com/office/drawing/2007/8/2/chart" Requires="c14">
@@ -944,11 +944,11 @@
           <c:showPercent val="0"/>
           <c:showBubbleSize val="0"/>
         </c:dLbls>
-        <c:axId val="408453096"/>
-        <c:axId val="408452704"/>
+        <c:axId val="34409472"/>
+        <c:axId val="34423552"/>
       </c:areaChart>
       <c:catAx>
-        <c:axId val="408453096"/>
+        <c:axId val="34409472"/>
         <c:scaling>
           <c:orientation val="minMax"/>
         </c:scaling>
@@ -958,7 +958,7 @@
         <c:majorTickMark val="out"/>
         <c:minorTickMark val="none"/>
         <c:tickLblPos val="nextTo"/>
-        <c:crossAx val="408452704"/>
+        <c:crossAx val="34423552"/>
         <c:crosses val="autoZero"/>
         <c:auto val="1"/>
         <c:lblAlgn val="ctr"/>
@@ -966,7 +966,7 @@
         <c:noMultiLvlLbl val="0"/>
       </c:catAx>
       <c:valAx>
-        <c:axId val="408452704"/>
+        <c:axId val="34423552"/>
         <c:scaling>
           <c:orientation val="minMax"/>
           <c:max val="100"/>
@@ -1008,7 +1008,7 @@
             <a:endParaRPr lang="en-US"/>
           </a:p>
         </c:txPr>
-        <c:crossAx val="408453096"/>
+        <c:crossAx val="34409472"/>
         <c:crosses val="autoZero"/>
         <c:crossBetween val="midCat"/>
         <c:majorUnit val="25"/>
@@ -1037,7 +1037,7 @@
 <file path=ppt/charts/chart5.xml><?xml version="1.0" encoding="utf-8"?>
 <c:chartSpace xmlns:c="http://schemas.openxmlformats.org/drawingml/2006/chart" xmlns:a="http://schemas.openxmlformats.org/drawingml/2006/main" xmlns:r="http://schemas.openxmlformats.org/officeDocument/2006/relationships">
   <c:date1904 val="0"/>
-  <c:lang val="en-US"/>
+  <c:lang val="en-AU"/>
   <c:roundedCorners val="0"/>
   <mc:AlternateContent xmlns:mc="http://schemas.openxmlformats.org/markup-compatibility/2006">
     <mc:Choice xmlns:c14="http://schemas.microsoft.com/office/drawing/2007/8/2/chart" Requires="c14">
@@ -1242,11 +1242,11 @@
         </c:dLbls>
         <c:marker val="1"/>
         <c:smooth val="0"/>
-        <c:axId val="408452312"/>
-        <c:axId val="408451528"/>
+        <c:axId val="34466816"/>
+        <c:axId val="34866304"/>
       </c:lineChart>
       <c:catAx>
-        <c:axId val="408452312"/>
+        <c:axId val="34466816"/>
         <c:scaling>
           <c:orientation val="minMax"/>
         </c:scaling>
@@ -1273,7 +1273,7 @@
             <a:endParaRPr lang="en-US"/>
           </a:p>
         </c:txPr>
-        <c:crossAx val="408451528"/>
+        <c:crossAx val="34866304"/>
         <c:crosses val="autoZero"/>
         <c:auto val="1"/>
         <c:lblAlgn val="ctr"/>
@@ -1281,7 +1281,7 @@
         <c:noMultiLvlLbl val="0"/>
       </c:catAx>
       <c:valAx>
-        <c:axId val="408451528"/>
+        <c:axId val="34866304"/>
         <c:scaling>
           <c:orientation val="minMax"/>
           <c:max val="15000000000"/>
@@ -1321,7 +1321,7 @@
             <a:endParaRPr lang="en-US"/>
           </a:p>
         </c:txPr>
-        <c:crossAx val="408452312"/>
+        <c:crossAx val="34466816"/>
         <c:crosses val="autoZero"/>
         <c:crossBetween val="between"/>
         <c:majorUnit val="3000000000"/>
@@ -1353,7 +1353,7 @@
 <file path=ppt/charts/chart6.xml><?xml version="1.0" encoding="utf-8"?>
 <c:chartSpace xmlns:c="http://schemas.openxmlformats.org/drawingml/2006/chart" xmlns:a="http://schemas.openxmlformats.org/drawingml/2006/main" xmlns:r="http://schemas.openxmlformats.org/officeDocument/2006/relationships">
   <c:date1904 val="0"/>
-  <c:lang val="en-US"/>
+  <c:lang val="en-AU"/>
   <c:roundedCorners val="0"/>
   <mc:AlternateContent xmlns:mc="http://schemas.openxmlformats.org/markup-compatibility/2006">
     <mc:Choice xmlns:c14="http://schemas.microsoft.com/office/drawing/2007/8/2/chart" Requires="c14">
@@ -1746,8 +1746,8 @@
         </c:dLbls>
         <c:gapWidth val="180"/>
         <c:overlap val="100"/>
-        <c:axId val="735305496"/>
-        <c:axId val="735304320"/>
+        <c:axId val="34853248"/>
+        <c:axId val="34854784"/>
       </c:barChart>
       <c:scatterChart>
         <c:scatterStyle val="lineMarker"/>
@@ -1856,11 +1856,11 @@
           <c:showPercent val="0"/>
           <c:showBubbleSize val="0"/>
         </c:dLbls>
-        <c:axId val="735305496"/>
-        <c:axId val="735304320"/>
+        <c:axId val="34853248"/>
+        <c:axId val="34854784"/>
       </c:scatterChart>
       <c:catAx>
-        <c:axId val="735305496"/>
+        <c:axId val="34853248"/>
         <c:scaling>
           <c:orientation val="minMax"/>
         </c:scaling>
@@ -1877,7 +1877,7 @@
             </a:solidFill>
           </a:ln>
         </c:spPr>
-        <c:crossAx val="735304320"/>
+        <c:crossAx val="34854784"/>
         <c:crosses val="autoZero"/>
         <c:auto val="1"/>
         <c:lblAlgn val="ctr"/>
@@ -1885,7 +1885,7 @@
         <c:noMultiLvlLbl val="0"/>
       </c:catAx>
       <c:valAx>
-        <c:axId val="735304320"/>
+        <c:axId val="34854784"/>
         <c:scaling>
           <c:orientation val="minMax"/>
           <c:max val="30"/>
@@ -1915,7 +1915,7 @@
             </a:solidFill>
           </a:ln>
         </c:spPr>
-        <c:crossAx val="735305496"/>
+        <c:crossAx val="34853248"/>
         <c:crosses val="autoZero"/>
         <c:crossBetween val="between"/>
         <c:majorUnit val="10"/>
@@ -1949,7 +1949,7 @@
 <file path=ppt/charts/chart7.xml><?xml version="1.0" encoding="utf-8"?>
 <c:chartSpace xmlns:c="http://schemas.openxmlformats.org/drawingml/2006/chart" xmlns:a="http://schemas.openxmlformats.org/drawingml/2006/main" xmlns:r="http://schemas.openxmlformats.org/officeDocument/2006/relationships">
   <c:date1904 val="0"/>
-  <c:lang val="en-US"/>
+  <c:lang val="en-AU"/>
   <c:roundedCorners val="0"/>
   <mc:AlternateContent xmlns:mc="http://schemas.openxmlformats.org/markup-compatibility/2006">
     <mc:Choice xmlns:c14="http://schemas.microsoft.com/office/drawing/2007/8/2/chart" Requires="c14">
@@ -2342,8 +2342,8 @@
         </c:dLbls>
         <c:gapWidth val="180"/>
         <c:overlap val="100"/>
-        <c:axId val="729082624"/>
-        <c:axId val="729085368"/>
+        <c:axId val="35224960"/>
+        <c:axId val="35226752"/>
       </c:barChart>
       <c:scatterChart>
         <c:scatterStyle val="lineMarker"/>
@@ -2452,11 +2452,11 @@
           <c:showPercent val="0"/>
           <c:showBubbleSize val="0"/>
         </c:dLbls>
-        <c:axId val="729082624"/>
-        <c:axId val="729085368"/>
+        <c:axId val="35224960"/>
+        <c:axId val="35226752"/>
       </c:scatterChart>
       <c:catAx>
-        <c:axId val="729082624"/>
+        <c:axId val="35224960"/>
         <c:scaling>
           <c:orientation val="minMax"/>
         </c:scaling>
@@ -2473,7 +2473,7 @@
             </a:solidFill>
           </a:ln>
         </c:spPr>
-        <c:crossAx val="729085368"/>
+        <c:crossAx val="35226752"/>
         <c:crosses val="autoZero"/>
         <c:auto val="1"/>
         <c:lblAlgn val="ctr"/>
@@ -2481,7 +2481,7 @@
         <c:noMultiLvlLbl val="0"/>
       </c:catAx>
       <c:valAx>
-        <c:axId val="729085368"/>
+        <c:axId val="35226752"/>
         <c:scaling>
           <c:orientation val="minMax"/>
           <c:max val="60"/>
@@ -2511,7 +2511,7 @@
             </a:solidFill>
           </a:ln>
         </c:spPr>
-        <c:crossAx val="729082624"/>
+        <c:crossAx val="35224960"/>
         <c:crosses val="autoZero"/>
         <c:crossBetween val="between"/>
         <c:majorUnit val="10"/>
@@ -2624,7 +2624,7 @@
           <a:p>
             <a:fld id="{EFC9C15E-BCC7-7848-B45B-7DE616F22962}" type="datetimeFigureOut">
               <a:rPr lang="en-US" smtClean="0"/>
-              <a:t>10/22/2016</a:t>
+              <a:t>10/28/2016</a:t>
             </a:fld>
             <a:endParaRPr lang="en-US"/>
           </a:p>
@@ -6584,14 +6584,14 @@
           <p:nvPr>
             <p:extLst>
               <p:ext uri="{D42A27DB-BD31-4B8C-83A1-F6EECF244321}">
-                <p14:modId xmlns:p14="http://schemas.microsoft.com/office/powerpoint/2010/main" val="3646246324"/>
+                <p14:modId xmlns:p14="http://schemas.microsoft.com/office/powerpoint/2010/main" val="1866148914"/>
               </p:ext>
             </p:extLst>
           </p:nvPr>
         </p:nvGraphicFramePr>
         <p:xfrm>
           <a:off x="0" y="-28511"/>
-          <a:ext cx="9906000" cy="6782851"/>
+          <a:ext cx="9906000" cy="6691568"/>
         </p:xfrm>
         <a:graphic>
           <a:graphicData uri="http://schemas.openxmlformats.org/drawingml/2006/table">
@@ -6603,42 +6603,42 @@
                 <a:gridCol w="920552">
                   <a:extLst>
                     <a:ext uri="{9D8B030D-6E8A-4147-A177-3AD203B41FA5}">
-                      <a16:colId xmlns="" xmlns:a16="http://schemas.microsoft.com/office/drawing/2014/main" val="20000"/>
+                      <a16:colId xmlns:a16="http://schemas.microsoft.com/office/drawing/2014/main" xmlns="" val="20000"/>
                     </a:ext>
                   </a:extLst>
                 </a:gridCol>
                 <a:gridCol w="1800200">
                   <a:extLst>
                     <a:ext uri="{9D8B030D-6E8A-4147-A177-3AD203B41FA5}">
-                      <a16:colId xmlns="" xmlns:a16="http://schemas.microsoft.com/office/drawing/2014/main" val="20001"/>
+                      <a16:colId xmlns:a16="http://schemas.microsoft.com/office/drawing/2014/main" xmlns="" val="20001"/>
                     </a:ext>
                   </a:extLst>
                 </a:gridCol>
                 <a:gridCol w="1512168">
                   <a:extLst>
                     <a:ext uri="{9D8B030D-6E8A-4147-A177-3AD203B41FA5}">
-                      <a16:colId xmlns="" xmlns:a16="http://schemas.microsoft.com/office/drawing/2014/main" val="20002"/>
+                      <a16:colId xmlns:a16="http://schemas.microsoft.com/office/drawing/2014/main" xmlns="" val="20002"/>
                     </a:ext>
                   </a:extLst>
                 </a:gridCol>
                 <a:gridCol w="1944216">
                   <a:extLst>
                     <a:ext uri="{9D8B030D-6E8A-4147-A177-3AD203B41FA5}">
-                      <a16:colId xmlns="" xmlns:a16="http://schemas.microsoft.com/office/drawing/2014/main" val="20003"/>
+                      <a16:colId xmlns:a16="http://schemas.microsoft.com/office/drawing/2014/main" xmlns="" val="20003"/>
                     </a:ext>
                   </a:extLst>
                 </a:gridCol>
                 <a:gridCol w="1728192">
                   <a:extLst>
                     <a:ext uri="{9D8B030D-6E8A-4147-A177-3AD203B41FA5}">
-                      <a16:colId xmlns="" xmlns:a16="http://schemas.microsoft.com/office/drawing/2014/main" val="20004"/>
+                      <a16:colId xmlns:a16="http://schemas.microsoft.com/office/drawing/2014/main" xmlns="" val="20004"/>
                     </a:ext>
                   </a:extLst>
                 </a:gridCol>
                 <a:gridCol w="2000672">
                   <a:extLst>
                     <a:ext uri="{9D8B030D-6E8A-4147-A177-3AD203B41FA5}">
-                      <a16:colId xmlns="" xmlns:a16="http://schemas.microsoft.com/office/drawing/2014/main" val="20005"/>
+                      <a16:colId xmlns:a16="http://schemas.microsoft.com/office/drawing/2014/main" xmlns="" val="20005"/>
                     </a:ext>
                   </a:extLst>
                 </a:gridCol>
@@ -6953,11 +6953,11 @@
                 </a:tc>
                 <a:extLst>
                   <a:ext uri="{0D108BD9-81ED-4DB2-BD59-A6C34878D82A}">
-                    <a16:rowId xmlns="" xmlns:a16="http://schemas.microsoft.com/office/drawing/2014/main" val="10000"/>
+                    <a16:rowId xmlns:a16="http://schemas.microsoft.com/office/drawing/2014/main" xmlns="" val="10000"/>
                   </a:ext>
                 </a:extLst>
               </a:tr>
-              <a:tr h="525533">
+              <a:tr h="649918">
                 <a:tc>
                   <a:txBody>
                     <a:bodyPr/>
@@ -7287,11 +7287,11 @@
                 </a:tc>
                 <a:extLst>
                   <a:ext uri="{0D108BD9-81ED-4DB2-BD59-A6C34878D82A}">
-                    <a16:rowId xmlns="" xmlns:a16="http://schemas.microsoft.com/office/drawing/2014/main" val="10001"/>
+                    <a16:rowId xmlns:a16="http://schemas.microsoft.com/office/drawing/2014/main" xmlns="" val="10001"/>
                   </a:ext>
                 </a:extLst>
               </a:tr>
-              <a:tr h="196393">
+              <a:tr h="52377">
                 <a:tc>
                   <a:txBody>
                     <a:bodyPr/>
@@ -7525,11 +7525,11 @@
                 </a:tc>
                 <a:extLst>
                   <a:ext uri="{0D108BD9-81ED-4DB2-BD59-A6C34878D82A}">
-                    <a16:rowId xmlns="" xmlns:a16="http://schemas.microsoft.com/office/drawing/2014/main" val="10002"/>
+                    <a16:rowId xmlns:a16="http://schemas.microsoft.com/office/drawing/2014/main" xmlns="" val="10002"/>
                   </a:ext>
                 </a:extLst>
               </a:tr>
-              <a:tr h="936104">
+              <a:tr h="1050780">
                 <a:tc>
                   <a:txBody>
                     <a:bodyPr/>
@@ -7547,24 +7547,7 @@
                         </a:spcAft>
                       </a:pPr>
                       <a:r>
-                        <a:rPr lang="en-AU" sz="2200" dirty="0">
-                          <a:solidFill>
-                            <a:schemeClr val="tx1"/>
-                          </a:solidFill>
-                          <a:effectLst/>
-                        </a:rPr>
-                        <a:t/>
-                      </a:r>
-                      <a:br>
-                        <a:rPr lang="en-AU" sz="2200" dirty="0">
-                          <a:solidFill>
-                            <a:schemeClr val="tx1"/>
-                          </a:solidFill>
-                          <a:effectLst/>
-                        </a:rPr>
-                      </a:br>
-                      <a:r>
-                        <a:rPr lang="en-AU" sz="2200" dirty="0" err="1">
+                        <a:rPr lang="en-AU" sz="1800" dirty="0" err="1" smtClean="0">
                           <a:solidFill>
                             <a:schemeClr val="tx1"/>
                           </a:solidFill>
@@ -7572,7 +7555,7 @@
                         </a:rPr>
                         <a:t>C’wlth</a:t>
                       </a:r>
-                      <a:endParaRPr lang="en-AU" sz="2200" dirty="0">
+                      <a:endParaRPr lang="en-AU" sz="1800" dirty="0">
                         <a:solidFill>
                           <a:schemeClr val="tx1"/>
                         </a:solidFill>
@@ -7667,7 +7650,7 @@
                 </a:tc>
                 <a:extLst>
                   <a:ext uri="{0D108BD9-81ED-4DB2-BD59-A6C34878D82A}">
-                    <a16:rowId xmlns="" xmlns:a16="http://schemas.microsoft.com/office/drawing/2014/main" val="10003"/>
+                    <a16:rowId xmlns:a16="http://schemas.microsoft.com/office/drawing/2014/main" xmlns="" val="10003"/>
                   </a:ext>
                 </a:extLst>
               </a:tr>
@@ -7676,28 +7659,6 @@
                   <a:txBody>
                     <a:bodyPr/>
                     <a:lstStyle/>
-                    <a:p>
-                      <a:pPr marL="540385" algn="r">
-                        <a:lnSpc>
-                          <a:spcPct val="115000"/>
-                        </a:lnSpc>
-                        <a:spcBef>
-                          <a:spcPts val="1200"/>
-                        </a:spcBef>
-                        <a:spcAft>
-                          <a:spcPts val="0"/>
-                        </a:spcAft>
-                      </a:pPr>
-                      <a:r>
-                        <a:rPr lang="en-AU" sz="2200" dirty="0">
-                          <a:solidFill>
-                            <a:schemeClr val="tx1"/>
-                          </a:solidFill>
-                          <a:effectLst/>
-                        </a:rPr>
-                        <a:t> </a:t>
-                      </a:r>
-                    </a:p>
                     <a:p>
                       <a:pPr marL="0" indent="0" algn="r">
                         <a:lnSpc>
@@ -7711,7 +7672,7 @@
                         </a:spcAft>
                       </a:pPr>
                       <a:r>
-                        <a:rPr lang="en-AU" sz="2200" dirty="0">
+                        <a:rPr lang="en-AU" sz="1800" dirty="0" smtClean="0">
                           <a:solidFill>
                             <a:schemeClr val="tx1"/>
                           </a:solidFill>
@@ -7719,7 +7680,7 @@
                         </a:rPr>
                         <a:t>NSW</a:t>
                       </a:r>
-                      <a:endParaRPr lang="en-AU" sz="2200" dirty="0">
+                      <a:endParaRPr lang="en-AU" sz="1800" dirty="0">
                         <a:solidFill>
                           <a:schemeClr val="tx1"/>
                         </a:solidFill>
@@ -7785,11 +7746,11 @@
                 </a:tc>
                 <a:extLst>
                   <a:ext uri="{0D108BD9-81ED-4DB2-BD59-A6C34878D82A}">
-                    <a16:rowId xmlns="" xmlns:a16="http://schemas.microsoft.com/office/drawing/2014/main" val="10004"/>
+                    <a16:rowId xmlns:a16="http://schemas.microsoft.com/office/drawing/2014/main" xmlns="" val="10004"/>
                   </a:ext>
                 </a:extLst>
               </a:tr>
-              <a:tr h="1008112">
+              <a:tr h="834756">
                 <a:tc>
                   <a:txBody>
                     <a:bodyPr/>
@@ -7807,24 +7768,7 @@
                         </a:spcAft>
                       </a:pPr>
                       <a:r>
-                        <a:rPr lang="en-AU" sz="2200" dirty="0">
-                          <a:solidFill>
-                            <a:schemeClr val="tx1"/>
-                          </a:solidFill>
-                          <a:effectLst/>
-                        </a:rPr>
-                        <a:t/>
-                      </a:r>
-                      <a:br>
-                        <a:rPr lang="en-AU" sz="2200" dirty="0">
-                          <a:solidFill>
-                            <a:schemeClr val="tx1"/>
-                          </a:solidFill>
-                          <a:effectLst/>
-                        </a:rPr>
-                      </a:br>
-                      <a:r>
-                        <a:rPr lang="en-AU" sz="2200" dirty="0">
+                        <a:rPr lang="en-AU" sz="1800" dirty="0" smtClean="0">
                           <a:solidFill>
                             <a:schemeClr val="tx1"/>
                           </a:solidFill>
@@ -7832,6 +7776,12 @@
                         </a:rPr>
                         <a:t>VIC</a:t>
                       </a:r>
+                      <a:endParaRPr lang="en-AU" sz="1800" dirty="0">
+                        <a:solidFill>
+                          <a:schemeClr val="tx1"/>
+                        </a:solidFill>
+                        <a:effectLst/>
+                      </a:endParaRPr>
                     </a:p>
                     <a:p>
                       <a:pPr marL="540385" algn="ctr">
@@ -7846,7 +7796,7 @@
                         </a:spcAft>
                       </a:pPr>
                       <a:r>
-                        <a:rPr lang="en-AU" sz="2200" dirty="0">
+                        <a:rPr lang="en-AU" sz="1800" dirty="0">
                           <a:solidFill>
                             <a:schemeClr val="tx1"/>
                           </a:solidFill>
@@ -7854,7 +7804,7 @@
                         </a:rPr>
                         <a:t> </a:t>
                       </a:r>
-                      <a:endParaRPr lang="en-AU" sz="2200" dirty="0">
+                      <a:endParaRPr lang="en-AU" sz="1800" dirty="0">
                         <a:solidFill>
                           <a:schemeClr val="tx1"/>
                         </a:solidFill>
@@ -7920,7 +7870,7 @@
                 </a:tc>
                 <a:extLst>
                   <a:ext uri="{0D108BD9-81ED-4DB2-BD59-A6C34878D82A}">
-                    <a16:rowId xmlns="" xmlns:a16="http://schemas.microsoft.com/office/drawing/2014/main" val="10005"/>
+                    <a16:rowId xmlns:a16="http://schemas.microsoft.com/office/drawing/2014/main" xmlns="" val="10005"/>
                   </a:ext>
                 </a:extLst>
               </a:tr>
@@ -7942,7 +7892,7 @@
                         </a:spcAft>
                       </a:pPr>
                       <a:r>
-                        <a:rPr lang="en-AU" sz="2200" dirty="0">
+                        <a:rPr lang="en-AU" sz="1800" dirty="0">
                           <a:solidFill>
                             <a:schemeClr val="tx1"/>
                           </a:solidFill>
@@ -7950,7 +7900,7 @@
                         </a:rPr>
                         <a:t>QLD</a:t>
                       </a:r>
-                      <a:endParaRPr lang="en-AU" sz="2200" dirty="0">
+                      <a:endParaRPr lang="en-AU" sz="1800" dirty="0">
                         <a:solidFill>
                           <a:schemeClr val="tx1"/>
                         </a:solidFill>
@@ -8016,17 +7966,17 @@
                 </a:tc>
                 <a:extLst>
                   <a:ext uri="{0D108BD9-81ED-4DB2-BD59-A6C34878D82A}">
-                    <a16:rowId xmlns="" xmlns:a16="http://schemas.microsoft.com/office/drawing/2014/main" val="10006"/>
+                    <a16:rowId xmlns:a16="http://schemas.microsoft.com/office/drawing/2014/main" xmlns="" val="10006"/>
                   </a:ext>
                 </a:extLst>
               </a:tr>
-              <a:tr h="792088">
+              <a:tr h="936104">
                 <a:tc>
                   <a:txBody>
                     <a:bodyPr/>
                     <a:lstStyle/>
                     <a:p>
-                      <a:pPr marL="540385" algn="r">
+                      <a:pPr marL="539750" indent="-361950" algn="r">
                         <a:lnSpc>
                           <a:spcPct val="115000"/>
                         </a:lnSpc>
@@ -8038,7 +7988,7 @@
                         </a:spcAft>
                       </a:pPr>
                       <a:r>
-                        <a:rPr lang="en-AU" sz="2200" dirty="0">
+                        <a:rPr lang="en-AU" sz="1800" dirty="0">
                           <a:solidFill>
                             <a:schemeClr val="tx1"/>
                           </a:solidFill>
@@ -8046,7 +7996,7 @@
                         </a:rPr>
                         <a:t>WA</a:t>
                       </a:r>
-                      <a:endParaRPr lang="en-AU" sz="2200" dirty="0">
+                      <a:endParaRPr lang="en-AU" sz="1800" dirty="0">
                         <a:solidFill>
                           <a:schemeClr val="tx1"/>
                         </a:solidFill>
@@ -8112,7 +8062,7 @@
                 </a:tc>
                 <a:extLst>
                   <a:ext uri="{0D108BD9-81ED-4DB2-BD59-A6C34878D82A}">
-                    <a16:rowId xmlns="" xmlns:a16="http://schemas.microsoft.com/office/drawing/2014/main" val="10007"/>
+                    <a16:rowId xmlns:a16="http://schemas.microsoft.com/office/drawing/2014/main" xmlns="" val="10007"/>
                   </a:ext>
                 </a:extLst>
               </a:tr>
@@ -8134,24 +8084,7 @@
                         </a:spcAft>
                       </a:pPr>
                       <a:r>
-                        <a:rPr lang="en-AU" sz="2200" dirty="0">
-                          <a:solidFill>
-                            <a:schemeClr val="tx1"/>
-                          </a:solidFill>
-                          <a:effectLst/>
-                        </a:rPr>
-                        <a:t/>
-                      </a:r>
-                      <a:br>
-                        <a:rPr lang="en-AU" sz="2200" dirty="0">
-                          <a:solidFill>
-                            <a:schemeClr val="tx1"/>
-                          </a:solidFill>
-                          <a:effectLst/>
-                        </a:rPr>
-                      </a:br>
-                      <a:r>
-                        <a:rPr lang="en-AU" sz="2200" dirty="0">
+                        <a:rPr lang="en-AU" sz="1800" dirty="0" smtClean="0">
                           <a:solidFill>
                             <a:schemeClr val="tx1"/>
                           </a:solidFill>
@@ -8159,7 +8092,7 @@
                         </a:rPr>
                         <a:t>SA</a:t>
                       </a:r>
-                      <a:endParaRPr lang="en-AU" sz="2200" dirty="0">
+                      <a:endParaRPr lang="en-AU" sz="1800" dirty="0">
                         <a:solidFill>
                           <a:schemeClr val="tx1"/>
                         </a:solidFill>
@@ -8234,7 +8167,7 @@
                 </a:tc>
                 <a:extLst>
                   <a:ext uri="{0D108BD9-81ED-4DB2-BD59-A6C34878D82A}">
-                    <a16:rowId xmlns="" xmlns:a16="http://schemas.microsoft.com/office/drawing/2014/main" val="10008"/>
+                    <a16:rowId xmlns:a16="http://schemas.microsoft.com/office/drawing/2014/main" xmlns="" val="10008"/>
                   </a:ext>
                 </a:extLst>
               </a:tr>
@@ -8244,7 +8177,7 @@
       </p:graphicFrame>
       <p:pic>
         <p:nvPicPr>
-          <p:cNvPr id="1025" name="Picture 11"/>
+          <p:cNvPr id="1026" name="Picture 2"/>
           <p:cNvPicPr>
             <a:picLocks noChangeAspect="1" noChangeArrowheads="1"/>
           </p:cNvPicPr>
@@ -8265,20 +8198,43 @@
         </p:blipFill>
         <p:spPr bwMode="auto">
           <a:xfrm>
-            <a:off x="984278" y="980728"/>
-            <a:ext cx="8939595" cy="5316079"/>
+            <a:off x="920552" y="1033954"/>
+            <a:ext cx="9004378" cy="5347374"/>
           </a:xfrm>
           <a:prstGeom prst="rect">
             <a:avLst/>
           </a:prstGeom>
           <a:noFill/>
+          <a:ln>
+            <a:noFill/>
+          </a:ln>
+          <a:effectLst/>
           <a:extLst>
             <a:ext uri="{909E8E84-426E-40DD-AFC4-6F175D3DCCD1}">
               <a14:hiddenFill xmlns:a14="http://schemas.microsoft.com/office/drawing/2010/main">
                 <a:solidFill>
-                  <a:srgbClr val="FFFFFF"/>
+                  <a:schemeClr val="accent1"/>
                 </a:solidFill>
               </a14:hiddenFill>
+            </a:ext>
+            <a:ext uri="{91240B29-F687-4F45-9708-019B960494DF}">
+              <a14:hiddenLine xmlns:a14="http://schemas.microsoft.com/office/drawing/2010/main" w="9525">
+                <a:solidFill>
+                  <a:schemeClr val="tx1"/>
+                </a:solidFill>
+                <a:miter lim="800000"/>
+                <a:headEnd/>
+                <a:tailEnd/>
+              </a14:hiddenLine>
+            </a:ext>
+            <a:ext uri="{AF507438-7753-43E0-B8FC-AC1667EBCBE1}">
+              <a14:hiddenEffects xmlns:a14="http://schemas.microsoft.com/office/drawing/2010/main">
+                <a:effectLst>
+                  <a:outerShdw dist="35921" dir="2700000" algn="ctr" rotWithShape="0">
+                    <a:schemeClr val="bg2"/>
+                  </a:outerShdw>
+                </a:effectLst>
+              </a14:hiddenEffects>
             </a:ext>
           </a:extLst>
         </p:spPr>
@@ -8724,35 +8680,35 @@
                 <a:gridCol w="1584176">
                   <a:extLst>
                     <a:ext uri="{9D8B030D-6E8A-4147-A177-3AD203B41FA5}">
-                      <a16:colId xmlns="" xmlns:a16="http://schemas.microsoft.com/office/drawing/2014/main" val="20000"/>
+                      <a16:colId xmlns:a16="http://schemas.microsoft.com/office/drawing/2014/main" xmlns="" val="20000"/>
                     </a:ext>
                   </a:extLst>
                 </a:gridCol>
                 <a:gridCol w="1890881">
                   <a:extLst>
                     <a:ext uri="{9D8B030D-6E8A-4147-A177-3AD203B41FA5}">
-                      <a16:colId xmlns="" xmlns:a16="http://schemas.microsoft.com/office/drawing/2014/main" val="20001"/>
+                      <a16:colId xmlns:a16="http://schemas.microsoft.com/office/drawing/2014/main" xmlns="" val="20001"/>
                     </a:ext>
                   </a:extLst>
                 </a:gridCol>
                 <a:gridCol w="1937289">
                   <a:extLst>
                     <a:ext uri="{9D8B030D-6E8A-4147-A177-3AD203B41FA5}">
-                      <a16:colId xmlns="" xmlns:a16="http://schemas.microsoft.com/office/drawing/2014/main" val="20002"/>
+                      <a16:colId xmlns:a16="http://schemas.microsoft.com/office/drawing/2014/main" xmlns="" val="20002"/>
                     </a:ext>
                   </a:extLst>
                 </a:gridCol>
                 <a:gridCol w="1937289">
                   <a:extLst>
                     <a:ext uri="{9D8B030D-6E8A-4147-A177-3AD203B41FA5}">
-                      <a16:colId xmlns="" xmlns:a16="http://schemas.microsoft.com/office/drawing/2014/main" val="20003"/>
+                      <a16:colId xmlns:a16="http://schemas.microsoft.com/office/drawing/2014/main" xmlns="" val="20003"/>
                     </a:ext>
                   </a:extLst>
                 </a:gridCol>
                 <a:gridCol w="2571918">
                   <a:extLst>
                     <a:ext uri="{9D8B030D-6E8A-4147-A177-3AD203B41FA5}">
-                      <a16:colId xmlns="" xmlns:a16="http://schemas.microsoft.com/office/drawing/2014/main" val="20004"/>
+                      <a16:colId xmlns:a16="http://schemas.microsoft.com/office/drawing/2014/main" xmlns="" val="20004"/>
                     </a:ext>
                   </a:extLst>
                 </a:gridCol>
@@ -9005,7 +8961,7 @@
                 </a:tc>
                 <a:extLst>
                   <a:ext uri="{0D108BD9-81ED-4DB2-BD59-A6C34878D82A}">
-                    <a16:rowId xmlns="" xmlns:a16="http://schemas.microsoft.com/office/drawing/2014/main" val="10000"/>
+                    <a16:rowId xmlns:a16="http://schemas.microsoft.com/office/drawing/2014/main" xmlns="" val="10000"/>
                   </a:ext>
                 </a:extLst>
               </a:tr>
@@ -9359,7 +9315,7 @@
                 </a:tc>
                 <a:extLst>
                   <a:ext uri="{0D108BD9-81ED-4DB2-BD59-A6C34878D82A}">
-                    <a16:rowId xmlns="" xmlns:a16="http://schemas.microsoft.com/office/drawing/2014/main" val="10001"/>
+                    <a16:rowId xmlns:a16="http://schemas.microsoft.com/office/drawing/2014/main" xmlns="" val="10001"/>
                   </a:ext>
                 </a:extLst>
               </a:tr>
@@ -9653,7 +9609,7 @@
                 </a:tc>
                 <a:extLst>
                   <a:ext uri="{0D108BD9-81ED-4DB2-BD59-A6C34878D82A}">
-                    <a16:rowId xmlns="" xmlns:a16="http://schemas.microsoft.com/office/drawing/2014/main" val="10002"/>
+                    <a16:rowId xmlns:a16="http://schemas.microsoft.com/office/drawing/2014/main" xmlns="" val="10002"/>
                   </a:ext>
                 </a:extLst>
               </a:tr>
@@ -10007,7 +9963,7 @@
                 </a:tc>
                 <a:extLst>
                   <a:ext uri="{0D108BD9-81ED-4DB2-BD59-A6C34878D82A}">
-                    <a16:rowId xmlns="" xmlns:a16="http://schemas.microsoft.com/office/drawing/2014/main" val="10003"/>
+                    <a16:rowId xmlns:a16="http://schemas.microsoft.com/office/drawing/2014/main" xmlns="" val="10003"/>
                   </a:ext>
                 </a:extLst>
               </a:tr>
@@ -10361,7 +10317,7 @@
                 </a:tc>
                 <a:extLst>
                   <a:ext uri="{0D108BD9-81ED-4DB2-BD59-A6C34878D82A}">
-                    <a16:rowId xmlns="" xmlns:a16="http://schemas.microsoft.com/office/drawing/2014/main" val="10004"/>
+                    <a16:rowId xmlns:a16="http://schemas.microsoft.com/office/drawing/2014/main" xmlns="" val="10004"/>
                   </a:ext>
                 </a:extLst>
               </a:tr>
@@ -10715,7 +10671,7 @@
                 </a:tc>
                 <a:extLst>
                   <a:ext uri="{0D108BD9-81ED-4DB2-BD59-A6C34878D82A}">
-                    <a16:rowId xmlns="" xmlns:a16="http://schemas.microsoft.com/office/drawing/2014/main" val="10005"/>
+                    <a16:rowId xmlns:a16="http://schemas.microsoft.com/office/drawing/2014/main" xmlns="" val="10005"/>
                   </a:ext>
                 </a:extLst>
               </a:tr>
@@ -11069,7 +11025,7 @@
                 </a:tc>
                 <a:extLst>
                   <a:ext uri="{0D108BD9-81ED-4DB2-BD59-A6C34878D82A}">
-                    <a16:rowId xmlns="" xmlns:a16="http://schemas.microsoft.com/office/drawing/2014/main" val="10006"/>
+                    <a16:rowId xmlns:a16="http://schemas.microsoft.com/office/drawing/2014/main" xmlns="" val="10006"/>
                   </a:ext>
                 </a:extLst>
               </a:tr>
@@ -11423,7 +11379,7 @@
                 </a:tc>
                 <a:extLst>
                   <a:ext uri="{0D108BD9-81ED-4DB2-BD59-A6C34878D82A}">
-                    <a16:rowId xmlns="" xmlns:a16="http://schemas.microsoft.com/office/drawing/2014/main" val="10007"/>
+                    <a16:rowId xmlns:a16="http://schemas.microsoft.com/office/drawing/2014/main" xmlns="" val="10007"/>
                   </a:ext>
                 </a:extLst>
               </a:tr>

</xml_diff>

<commit_message>
Move figure; clean xrefs; update first appendix chart
</commit_message>
<xml_diff>
--- a/atlas/AppendixCharts.pptx
+++ b/atlas/AppendixCharts.pptx
@@ -152,7 +152,7 @@
   </p:defaultTextStyle>
   <p:extLst>
     <p:ext uri="{EFAFB233-063F-42B5-8137-9DF3F51BA10A}">
-      <p15:sldGuideLst xmlns:p15="http://schemas.microsoft.com/office/powerpoint/2012/main" xmlns="">
+      <p15:sldGuideLst xmlns:p15="http://schemas.microsoft.com/office/powerpoint/2012/main">
         <p15:guide id="1" orient="horz" pos="4001">
           <p15:clr>
             <a:srgbClr val="A4A3A4"/>
@@ -171,7 +171,7 @@
       </p15:sldGuideLst>
     </p:ext>
     <p:ext uri="{2D200454-40CA-4A62-9FC3-DE9A4176ACB9}">
-      <p15:notesGuideLst xmlns:p15="http://schemas.microsoft.com/office/powerpoint/2012/main" xmlns="">
+      <p15:notesGuideLst xmlns:p15="http://schemas.microsoft.com/office/powerpoint/2012/main">
         <p15:guide id="1" orient="horz" pos="3131">
           <p15:clr>
             <a:srgbClr val="A4A3A4"/>
@@ -189,9 +189,9 @@
 </file>
 
 <file path=ppt/charts/chart1.xml><?xml version="1.0" encoding="utf-8"?>
-<c:chartSpace xmlns:c="http://schemas.openxmlformats.org/drawingml/2006/chart" xmlns:a="http://schemas.openxmlformats.org/drawingml/2006/main" xmlns:r="http://schemas.openxmlformats.org/officeDocument/2006/relationships">
+<c:chartSpace xmlns:c="http://schemas.openxmlformats.org/drawingml/2006/chart" xmlns:a="http://schemas.openxmlformats.org/drawingml/2006/main" xmlns:r="http://schemas.openxmlformats.org/officeDocument/2006/relationships" xmlns:c16r2="http://schemas.microsoft.com/office/drawing/2015/06/chart">
   <c:date1904 val="0"/>
-  <c:lang val="en-AU"/>
+  <c:lang val="en-US"/>
   <c:roundedCorners val="0"/>
   <mc:AlternateContent xmlns:mc="http://schemas.openxmlformats.org/markup-compatibility/2006">
     <mc:Choice xmlns:c14="http://schemas.microsoft.com/office/drawing/2007/8/2/chart" Requires="c14">
@@ -258,7 +258,7 @@
               </c:numCache>
             </c:numRef>
           </c:val>
-          <c:extLst xmlns:c16r2="http://schemas.microsoft.com/office/drawing/2015/06/chart">
+          <c:extLst>
             <c:ext xmlns:c16="http://schemas.microsoft.com/office/drawing/2014/chart" uri="{C3380CC4-5D6E-409C-BE32-E72D297353CC}">
               <c16:uniqueId val="{00000000-AA54-4E5A-B780-6B0C36017FC2}"/>
             </c:ext>
@@ -320,7 +320,7 @@
               </c:numCache>
             </c:numRef>
           </c:val>
-          <c:extLst xmlns:c16r2="http://schemas.microsoft.com/office/drawing/2015/06/chart">
+          <c:extLst>
             <c:ext xmlns:c16="http://schemas.microsoft.com/office/drawing/2014/chart" uri="{C3380CC4-5D6E-409C-BE32-E72D297353CC}">
               <c16:uniqueId val="{00000001-AA54-4E5A-B780-6B0C36017FC2}"/>
             </c:ext>
@@ -421,9 +421,9 @@
 </file>
 
 <file path=ppt/charts/chart2.xml><?xml version="1.0" encoding="utf-8"?>
-<c:chartSpace xmlns:c="http://schemas.openxmlformats.org/drawingml/2006/chart" xmlns:a="http://schemas.openxmlformats.org/drawingml/2006/main" xmlns:r="http://schemas.openxmlformats.org/officeDocument/2006/relationships">
+<c:chartSpace xmlns:c="http://schemas.openxmlformats.org/drawingml/2006/chart" xmlns:a="http://schemas.openxmlformats.org/drawingml/2006/main" xmlns:r="http://schemas.openxmlformats.org/officeDocument/2006/relationships" xmlns:c16r2="http://schemas.microsoft.com/office/drawing/2015/06/chart">
   <c:date1904 val="0"/>
-  <c:lang val="en-AU"/>
+  <c:lang val="en-US"/>
   <c:roundedCorners val="0"/>
   <mc:AlternateContent xmlns:mc="http://schemas.openxmlformats.org/markup-compatibility/2006">
     <mc:Choice xmlns:c14="http://schemas.microsoft.com/office/drawing/2007/8/2/chart" Requires="c14">
@@ -475,7 +475,7 @@
               </c:numCache>
             </c:numRef>
           </c:val>
-          <c:extLst xmlns:c16r2="http://schemas.microsoft.com/office/drawing/2015/06/chart">
+          <c:extLst>
             <c:ext xmlns:c16="http://schemas.microsoft.com/office/drawing/2014/chart" uri="{C3380CC4-5D6E-409C-BE32-E72D297353CC}">
               <c16:uniqueId val="{00000000-98DA-4AD5-BDF6-019FFEDAD103}"/>
             </c:ext>
@@ -522,7 +522,7 @@
               </c:numCache>
             </c:numRef>
           </c:val>
-          <c:extLst xmlns:c16r2="http://schemas.microsoft.com/office/drawing/2015/06/chart">
+          <c:extLst>
             <c:ext xmlns:c16="http://schemas.microsoft.com/office/drawing/2014/chart" uri="{C3380CC4-5D6E-409C-BE32-E72D297353CC}">
               <c16:uniqueId val="{00000001-98DA-4AD5-BDF6-019FFEDAD103}"/>
             </c:ext>
@@ -627,9 +627,9 @@
 </file>
 
 <file path=ppt/charts/chart3.xml><?xml version="1.0" encoding="utf-8"?>
-<c:chartSpace xmlns:c="http://schemas.openxmlformats.org/drawingml/2006/chart" xmlns:a="http://schemas.openxmlformats.org/drawingml/2006/main" xmlns:r="http://schemas.openxmlformats.org/officeDocument/2006/relationships">
+<c:chartSpace xmlns:c="http://schemas.openxmlformats.org/drawingml/2006/chart" xmlns:a="http://schemas.openxmlformats.org/drawingml/2006/main" xmlns:r="http://schemas.openxmlformats.org/officeDocument/2006/relationships" xmlns:c16r2="http://schemas.microsoft.com/office/drawing/2015/06/chart">
   <c:date1904 val="0"/>
-  <c:lang val="en-AU"/>
+  <c:lang val="en-US"/>
   <c:roundedCorners val="0"/>
   <mc:AlternateContent xmlns:mc="http://schemas.openxmlformats.org/markup-compatibility/2006">
     <mc:Choice xmlns:c14="http://schemas.microsoft.com/office/drawing/2007/8/2/chart" Requires="c14">
@@ -681,7 +681,7 @@
               </c:numCache>
             </c:numRef>
           </c:val>
-          <c:extLst xmlns:c16r2="http://schemas.microsoft.com/office/drawing/2015/06/chart">
+          <c:extLst>
             <c:ext xmlns:c16="http://schemas.microsoft.com/office/drawing/2014/chart" uri="{C3380CC4-5D6E-409C-BE32-E72D297353CC}">
               <c16:uniqueId val="{00000000-15D1-4886-8E15-404F727AADF7}"/>
             </c:ext>
@@ -728,7 +728,7 @@
               </c:numCache>
             </c:numRef>
           </c:val>
-          <c:extLst xmlns:c16r2="http://schemas.microsoft.com/office/drawing/2015/06/chart">
+          <c:extLst>
             <c:ext xmlns:c16="http://schemas.microsoft.com/office/drawing/2014/chart" uri="{C3380CC4-5D6E-409C-BE32-E72D297353CC}">
               <c16:uniqueId val="{00000001-15D1-4886-8E15-404F727AADF7}"/>
             </c:ext>
@@ -829,9 +829,9 @@
 </file>
 
 <file path=ppt/charts/chart4.xml><?xml version="1.0" encoding="utf-8"?>
-<c:chartSpace xmlns:c="http://schemas.openxmlformats.org/drawingml/2006/chart" xmlns:a="http://schemas.openxmlformats.org/drawingml/2006/main" xmlns:r="http://schemas.openxmlformats.org/officeDocument/2006/relationships">
+<c:chartSpace xmlns:c="http://schemas.openxmlformats.org/drawingml/2006/chart" xmlns:a="http://schemas.openxmlformats.org/drawingml/2006/main" xmlns:r="http://schemas.openxmlformats.org/officeDocument/2006/relationships" xmlns:c16r2="http://schemas.microsoft.com/office/drawing/2015/06/chart">
   <c:date1904 val="0"/>
-  <c:lang val="en-AU"/>
+  <c:lang val="en-US"/>
   <c:roundedCorners val="0"/>
   <mc:AlternateContent xmlns:mc="http://schemas.openxmlformats.org/markup-compatibility/2006">
     <mc:Choice xmlns:c14="http://schemas.microsoft.com/office/drawing/2007/8/2/chart" Requires="c14">
@@ -883,7 +883,7 @@
               </c:numCache>
             </c:numRef>
           </c:val>
-          <c:extLst xmlns:c16r2="http://schemas.microsoft.com/office/drawing/2015/06/chart">
+          <c:extLst>
             <c:ext xmlns:c16="http://schemas.microsoft.com/office/drawing/2014/chart" uri="{C3380CC4-5D6E-409C-BE32-E72D297353CC}">
               <c16:uniqueId val="{00000000-EDCD-4E1F-A002-2D923E9A4BB9}"/>
             </c:ext>
@@ -930,7 +930,7 @@
               </c:numCache>
             </c:numRef>
           </c:val>
-          <c:extLst xmlns:c16r2="http://schemas.microsoft.com/office/drawing/2015/06/chart">
+          <c:extLst>
             <c:ext xmlns:c16="http://schemas.microsoft.com/office/drawing/2014/chart" uri="{C3380CC4-5D6E-409C-BE32-E72D297353CC}">
               <c16:uniqueId val="{00000001-EDCD-4E1F-A002-2D923E9A4BB9}"/>
             </c:ext>
@@ -1035,9 +1035,9 @@
 </file>
 
 <file path=ppt/charts/chart5.xml><?xml version="1.0" encoding="utf-8"?>
-<c:chartSpace xmlns:c="http://schemas.openxmlformats.org/drawingml/2006/chart" xmlns:a="http://schemas.openxmlformats.org/drawingml/2006/main" xmlns:r="http://schemas.openxmlformats.org/officeDocument/2006/relationships">
+<c:chartSpace xmlns:c="http://schemas.openxmlformats.org/drawingml/2006/chart" xmlns:a="http://schemas.openxmlformats.org/drawingml/2006/main" xmlns:r="http://schemas.openxmlformats.org/officeDocument/2006/relationships" xmlns:c16r2="http://schemas.microsoft.com/office/drawing/2015/06/chart">
   <c:date1904 val="0"/>
-  <c:lang val="en-AU"/>
+  <c:lang val="en-US"/>
   <c:roundedCorners val="0"/>
   <mc:AlternateContent xmlns:mc="http://schemas.openxmlformats.org/markup-compatibility/2006">
     <mc:Choice xmlns:c14="http://schemas.microsoft.com/office/drawing/2007/8/2/chart" Requires="c14">
@@ -1144,7 +1144,7 @@
             </c:numRef>
           </c:val>
           <c:smooth val="0"/>
-          <c:extLst xmlns:c16r2="http://schemas.microsoft.com/office/drawing/2015/06/chart">
+          <c:extLst>
             <c:ext xmlns:c16="http://schemas.microsoft.com/office/drawing/2014/chart" uri="{C3380CC4-5D6E-409C-BE32-E72D297353CC}">
               <c16:uniqueId val="{00000000-72E9-403B-9EF6-26FB264A9E30}"/>
             </c:ext>
@@ -1226,7 +1226,7 @@
             </c:numRef>
           </c:val>
           <c:smooth val="0"/>
-          <c:extLst xmlns:c16r2="http://schemas.microsoft.com/office/drawing/2015/06/chart">
+          <c:extLst>
             <c:ext xmlns:c16="http://schemas.microsoft.com/office/drawing/2014/chart" uri="{C3380CC4-5D6E-409C-BE32-E72D297353CC}">
               <c16:uniqueId val="{00000001-72E9-403B-9EF6-26FB264A9E30}"/>
             </c:ext>
@@ -1351,9 +1351,9 @@
 </file>
 
 <file path=ppt/charts/chart6.xml><?xml version="1.0" encoding="utf-8"?>
-<c:chartSpace xmlns:c="http://schemas.openxmlformats.org/drawingml/2006/chart" xmlns:a="http://schemas.openxmlformats.org/drawingml/2006/main" xmlns:r="http://schemas.openxmlformats.org/officeDocument/2006/relationships">
+<c:chartSpace xmlns:c="http://schemas.openxmlformats.org/drawingml/2006/chart" xmlns:a="http://schemas.openxmlformats.org/drawingml/2006/main" xmlns:r="http://schemas.openxmlformats.org/officeDocument/2006/relationships" xmlns:c16r2="http://schemas.microsoft.com/office/drawing/2015/06/chart">
   <c:date1904 val="0"/>
-  <c:lang val="en-AU"/>
+  <c:lang val="en-US"/>
   <c:roundedCorners val="0"/>
   <mc:AlternateContent xmlns:mc="http://schemas.openxmlformats.org/markup-compatibility/2006">
     <mc:Choice xmlns:c14="http://schemas.microsoft.com/office/drawing/2007/8/2/chart" Requires="c14">
@@ -1438,7 +1438,7 @@
               </c:numCache>
             </c:numRef>
           </c:val>
-          <c:extLst xmlns:c16r2="http://schemas.microsoft.com/office/drawing/2015/06/chart">
+          <c:extLst>
             <c:ext xmlns:c16="http://schemas.microsoft.com/office/drawing/2014/chart" uri="{C3380CC4-5D6E-409C-BE32-E72D297353CC}">
               <c16:uniqueId val="{00000000-56E9-4536-9410-9A28D00DB853}"/>
             </c:ext>
@@ -1485,7 +1485,7 @@
               </a:ln>
               <a:effectLst/>
             </c:spPr>
-            <c:extLst xmlns:c16r2="http://schemas.microsoft.com/office/drawing/2015/06/chart">
+            <c:extLst>
               <c:ext xmlns:c16="http://schemas.microsoft.com/office/drawing/2014/chart" uri="{C3380CC4-5D6E-409C-BE32-E72D297353CC}">
                 <c16:uniqueId val="{00000002-56E9-4536-9410-9A28D00DB853}"/>
               </c:ext>
@@ -1506,7 +1506,7 @@
               </a:ln>
               <a:effectLst/>
             </c:spPr>
-            <c:extLst xmlns:c16r2="http://schemas.microsoft.com/office/drawing/2015/06/chart">
+            <c:extLst>
               <c:ext xmlns:c16="http://schemas.microsoft.com/office/drawing/2014/chart" uri="{C3380CC4-5D6E-409C-BE32-E72D297353CC}">
                 <c16:uniqueId val="{00000004-56E9-4536-9410-9A28D00DB853}"/>
               </c:ext>
@@ -1527,7 +1527,7 @@
               </a:ln>
               <a:effectLst/>
             </c:spPr>
-            <c:extLst xmlns:c16r2="http://schemas.microsoft.com/office/drawing/2015/06/chart">
+            <c:extLst>
               <c:ext xmlns:c16="http://schemas.microsoft.com/office/drawing/2014/chart" uri="{C3380CC4-5D6E-409C-BE32-E72D297353CC}">
                 <c16:uniqueId val="{00000006-56E9-4536-9410-9A28D00DB853}"/>
               </c:ext>
@@ -1537,7 +1537,7 @@
             <c:idx val="3"/>
             <c:invertIfNegative val="0"/>
             <c:bubble3D val="0"/>
-            <c:extLst xmlns:c16r2="http://schemas.microsoft.com/office/drawing/2015/06/chart">
+            <c:extLst>
               <c:ext xmlns:c16="http://schemas.microsoft.com/office/drawing/2014/chart" uri="{C3380CC4-5D6E-409C-BE32-E72D297353CC}">
                 <c16:uniqueId val="{00000008-56E9-4536-9410-9A28D00DB853}"/>
               </c:ext>
@@ -1558,12 +1558,10 @@
               <c:showSerName val="0"/>
               <c:showPercent val="0"/>
               <c:showBubbleSize val="0"/>
-              <c:extLst xmlns:c16r2="http://schemas.microsoft.com/office/drawing/2015/06/chart">
+              <c:extLst>
+                <c:ext xmlns:c15="http://schemas.microsoft.com/office/drawing/2012/chart" uri="{CE6537A1-D6FC-4f65-9D91-7224C49458BB}"/>
                 <c:ext xmlns:c16="http://schemas.microsoft.com/office/drawing/2014/chart" uri="{C3380CC4-5D6E-409C-BE32-E72D297353CC}">
                   <c16:uniqueId val="{00000004-56E9-4536-9410-9A28D00DB853}"/>
-                </c:ext>
-                <c:ext xmlns:c15="http://schemas.microsoft.com/office/drawing/2012/chart" uri="{CE6537A1-D6FC-4f65-9D91-7224C49458BB}">
-                  <c15:layout/>
                 </c:ext>
               </c:extLst>
             </c:dLbl>
@@ -1603,18 +1601,15 @@
               <c:showSerName val="0"/>
               <c:showPercent val="0"/>
               <c:showBubbleSize val="0"/>
-              <c:extLst xmlns:c16r2="http://schemas.microsoft.com/office/drawing/2015/06/chart">
+              <c:extLst>
+                <c:ext xmlns:c15="http://schemas.microsoft.com/office/drawing/2012/chart" uri="{CE6537A1-D6FC-4f65-9D91-7224C49458BB}"/>
                 <c:ext xmlns:c16="http://schemas.microsoft.com/office/drawing/2014/chart" uri="{C3380CC4-5D6E-409C-BE32-E72D297353CC}">
                   <c16:uniqueId val="{00000006-56E9-4536-9410-9A28D00DB853}"/>
-                </c:ext>
-                <c:ext xmlns:c15="http://schemas.microsoft.com/office/drawing/2012/chart" uri="{CE6537A1-D6FC-4f65-9D91-7224C49458BB}">
-                  <c15:layout/>
                 </c:ext>
               </c:extLst>
             </c:dLbl>
             <c:dLbl>
               <c:idx val="3"/>
-              <c:layout/>
               <c:tx>
                 <c:rich>
                   <a:bodyPr/>
@@ -1646,14 +1641,13 @@
               <c:showSerName val="0"/>
               <c:showPercent val="0"/>
               <c:showBubbleSize val="0"/>
-              <c:extLst xmlns:c16r2="http://schemas.microsoft.com/office/drawing/2015/06/chart">
+              <c:extLst>
+                <c:ext xmlns:c15="http://schemas.microsoft.com/office/drawing/2012/chart" uri="{CE6537A1-D6FC-4f65-9D91-7224C49458BB}">
+                  <c15:dlblFieldTable/>
+                  <c15:showDataLabelsRange val="0"/>
+                </c:ext>
                 <c:ext xmlns:c16="http://schemas.microsoft.com/office/drawing/2014/chart" uri="{C3380CC4-5D6E-409C-BE32-E72D297353CC}">
                   <c16:uniqueId val="{00000008-56E9-4536-9410-9A28D00DB853}"/>
-                </c:ext>
-                <c:ext xmlns:c15="http://schemas.microsoft.com/office/drawing/2012/chart" uri="{CE6537A1-D6FC-4f65-9D91-7224C49458BB}">
-                  <c15:layout/>
-                  <c15:dlblFieldTable/>
-                  <c15:showDataLabelsRange val="0"/>
                 </c:ext>
               </c:extLst>
             </c:dLbl>
@@ -1682,9 +1676,8 @@
             <c:showPercent val="0"/>
             <c:showBubbleSize val="0"/>
             <c:showLeaderLines val="0"/>
-            <c:extLst xmlns:c16r2="http://schemas.microsoft.com/office/drawing/2015/06/chart">
+            <c:extLst>
               <c:ext xmlns:c15="http://schemas.microsoft.com/office/drawing/2012/chart" uri="{CE6537A1-D6FC-4f65-9D91-7224C49458BB}">
-                <c15:layout/>
                 <c15:showLeaderLines val="0"/>
               </c:ext>
             </c:extLst>
@@ -1730,7 +1723,7 @@
               </c:numCache>
             </c:numRef>
           </c:val>
-          <c:extLst xmlns:c16r2="http://schemas.microsoft.com/office/drawing/2015/06/chart">
+          <c:extLst>
             <c:ext xmlns:c16="http://schemas.microsoft.com/office/drawing/2014/chart" uri="{C3380CC4-5D6E-409C-BE32-E72D297353CC}">
               <c16:uniqueId val="{00000009-56E9-4536-9410-9A28D00DB853}"/>
             </c:ext>
@@ -1769,7 +1762,7 @@
           <c:dPt>
             <c:idx val="0"/>
             <c:bubble3D val="0"/>
-            <c:extLst xmlns:c16r2="http://schemas.microsoft.com/office/drawing/2015/06/chart">
+            <c:extLst>
               <c:ext xmlns:c16="http://schemas.microsoft.com/office/drawing/2014/chart" uri="{C3380CC4-5D6E-409C-BE32-E72D297353CC}">
                 <c16:uniqueId val="{0000000B-56E9-4536-9410-9A28D00DB853}"/>
               </c:ext>
@@ -1778,7 +1771,7 @@
           <c:dPt>
             <c:idx val="1"/>
             <c:bubble3D val="0"/>
-            <c:extLst xmlns:c16r2="http://schemas.microsoft.com/office/drawing/2015/06/chart">
+            <c:extLst>
               <c:ext xmlns:c16="http://schemas.microsoft.com/office/drawing/2014/chart" uri="{C3380CC4-5D6E-409C-BE32-E72D297353CC}">
                 <c16:uniqueId val="{0000000D-56E9-4536-9410-9A28D00DB853}"/>
               </c:ext>
@@ -1787,7 +1780,7 @@
           <c:dPt>
             <c:idx val="2"/>
             <c:bubble3D val="0"/>
-            <c:extLst xmlns:c16r2="http://schemas.microsoft.com/office/drawing/2015/06/chart">
+            <c:extLst>
               <c:ext xmlns:c16="http://schemas.microsoft.com/office/drawing/2014/chart" uri="{C3380CC4-5D6E-409C-BE32-E72D297353CC}">
                 <c16:uniqueId val="{0000000F-56E9-4536-9410-9A28D00DB853}"/>
               </c:ext>
@@ -1842,7 +1835,7 @@
             </c:numRef>
           </c:yVal>
           <c:smooth val="0"/>
-          <c:extLst xmlns:c16r2="http://schemas.microsoft.com/office/drawing/2015/06/chart">
+          <c:extLst>
             <c:ext xmlns:c16="http://schemas.microsoft.com/office/drawing/2014/chart" uri="{C3380CC4-5D6E-409C-BE32-E72D297353CC}">
               <c16:uniqueId val="{00000010-56E9-4536-9410-9A28D00DB853}"/>
             </c:ext>
@@ -1947,9 +1940,9 @@
 </file>
 
 <file path=ppt/charts/chart7.xml><?xml version="1.0" encoding="utf-8"?>
-<c:chartSpace xmlns:c="http://schemas.openxmlformats.org/drawingml/2006/chart" xmlns:a="http://schemas.openxmlformats.org/drawingml/2006/main" xmlns:r="http://schemas.openxmlformats.org/officeDocument/2006/relationships">
+<c:chartSpace xmlns:c="http://schemas.openxmlformats.org/drawingml/2006/chart" xmlns:a="http://schemas.openxmlformats.org/drawingml/2006/main" xmlns:r="http://schemas.openxmlformats.org/officeDocument/2006/relationships" xmlns:c16r2="http://schemas.microsoft.com/office/drawing/2015/06/chart">
   <c:date1904 val="0"/>
-  <c:lang val="en-AU"/>
+  <c:lang val="en-US"/>
   <c:roundedCorners val="0"/>
   <mc:AlternateContent xmlns:mc="http://schemas.openxmlformats.org/markup-compatibility/2006">
     <mc:Choice xmlns:c14="http://schemas.microsoft.com/office/drawing/2007/8/2/chart" Requires="c14">
@@ -2034,7 +2027,7 @@
               </c:numCache>
             </c:numRef>
           </c:val>
-          <c:extLst xmlns:c16r2="http://schemas.microsoft.com/office/drawing/2015/06/chart">
+          <c:extLst>
             <c:ext xmlns:c16="http://schemas.microsoft.com/office/drawing/2014/chart" uri="{C3380CC4-5D6E-409C-BE32-E72D297353CC}">
               <c16:uniqueId val="{00000000-56E9-4536-9410-9A28D00DB853}"/>
             </c:ext>
@@ -2081,7 +2074,7 @@
               </a:ln>
               <a:effectLst/>
             </c:spPr>
-            <c:extLst xmlns:c16r2="http://schemas.microsoft.com/office/drawing/2015/06/chart">
+            <c:extLst>
               <c:ext xmlns:c16="http://schemas.microsoft.com/office/drawing/2014/chart" uri="{C3380CC4-5D6E-409C-BE32-E72D297353CC}">
                 <c16:uniqueId val="{00000002-56E9-4536-9410-9A28D00DB853}"/>
               </c:ext>
@@ -2102,7 +2095,7 @@
               </a:ln>
               <a:effectLst/>
             </c:spPr>
-            <c:extLst xmlns:c16r2="http://schemas.microsoft.com/office/drawing/2015/06/chart">
+            <c:extLst>
               <c:ext xmlns:c16="http://schemas.microsoft.com/office/drawing/2014/chart" uri="{C3380CC4-5D6E-409C-BE32-E72D297353CC}">
                 <c16:uniqueId val="{00000004-56E9-4536-9410-9A28D00DB853}"/>
               </c:ext>
@@ -2123,7 +2116,7 @@
               </a:ln>
               <a:effectLst/>
             </c:spPr>
-            <c:extLst xmlns:c16r2="http://schemas.microsoft.com/office/drawing/2015/06/chart">
+            <c:extLst>
               <c:ext xmlns:c16="http://schemas.microsoft.com/office/drawing/2014/chart" uri="{C3380CC4-5D6E-409C-BE32-E72D297353CC}">
                 <c16:uniqueId val="{00000006-56E9-4536-9410-9A28D00DB853}"/>
               </c:ext>
@@ -2133,7 +2126,7 @@
             <c:idx val="3"/>
             <c:invertIfNegative val="0"/>
             <c:bubble3D val="0"/>
-            <c:extLst xmlns:c16r2="http://schemas.microsoft.com/office/drawing/2015/06/chart">
+            <c:extLst>
               <c:ext xmlns:c16="http://schemas.microsoft.com/office/drawing/2014/chart" uri="{C3380CC4-5D6E-409C-BE32-E72D297353CC}">
                 <c16:uniqueId val="{00000008-56E9-4536-9410-9A28D00DB853}"/>
               </c:ext>
@@ -2154,12 +2147,10 @@
               <c:showSerName val="0"/>
               <c:showPercent val="0"/>
               <c:showBubbleSize val="0"/>
-              <c:extLst xmlns:c16r2="http://schemas.microsoft.com/office/drawing/2015/06/chart">
+              <c:extLst>
+                <c:ext xmlns:c15="http://schemas.microsoft.com/office/drawing/2012/chart" uri="{CE6537A1-D6FC-4f65-9D91-7224C49458BB}"/>
                 <c:ext xmlns:c16="http://schemas.microsoft.com/office/drawing/2014/chart" uri="{C3380CC4-5D6E-409C-BE32-E72D297353CC}">
                   <c16:uniqueId val="{00000004-56E9-4536-9410-9A28D00DB853}"/>
-                </c:ext>
-                <c:ext xmlns:c15="http://schemas.microsoft.com/office/drawing/2012/chart" uri="{CE6537A1-D6FC-4f65-9D91-7224C49458BB}">
-                  <c15:layout/>
                 </c:ext>
               </c:extLst>
             </c:dLbl>
@@ -2199,18 +2190,15 @@
               <c:showSerName val="0"/>
               <c:showPercent val="0"/>
               <c:showBubbleSize val="0"/>
-              <c:extLst xmlns:c16r2="http://schemas.microsoft.com/office/drawing/2015/06/chart">
+              <c:extLst>
+                <c:ext xmlns:c15="http://schemas.microsoft.com/office/drawing/2012/chart" uri="{CE6537A1-D6FC-4f65-9D91-7224C49458BB}"/>
                 <c:ext xmlns:c16="http://schemas.microsoft.com/office/drawing/2014/chart" uri="{C3380CC4-5D6E-409C-BE32-E72D297353CC}">
                   <c16:uniqueId val="{00000006-56E9-4536-9410-9A28D00DB853}"/>
-                </c:ext>
-                <c:ext xmlns:c15="http://schemas.microsoft.com/office/drawing/2012/chart" uri="{CE6537A1-D6FC-4f65-9D91-7224C49458BB}">
-                  <c15:layout/>
                 </c:ext>
               </c:extLst>
             </c:dLbl>
             <c:dLbl>
               <c:idx val="3"/>
-              <c:layout/>
               <c:tx>
                 <c:rich>
                   <a:bodyPr/>
@@ -2242,14 +2230,13 @@
               <c:showSerName val="0"/>
               <c:showPercent val="0"/>
               <c:showBubbleSize val="0"/>
-              <c:extLst xmlns:c16r2="http://schemas.microsoft.com/office/drawing/2015/06/chart">
+              <c:extLst>
+                <c:ext xmlns:c15="http://schemas.microsoft.com/office/drawing/2012/chart" uri="{CE6537A1-D6FC-4f65-9D91-7224C49458BB}">
+                  <c15:dlblFieldTable/>
+                  <c15:showDataLabelsRange val="0"/>
+                </c:ext>
                 <c:ext xmlns:c16="http://schemas.microsoft.com/office/drawing/2014/chart" uri="{C3380CC4-5D6E-409C-BE32-E72D297353CC}">
                   <c16:uniqueId val="{00000008-56E9-4536-9410-9A28D00DB853}"/>
-                </c:ext>
-                <c:ext xmlns:c15="http://schemas.microsoft.com/office/drawing/2012/chart" uri="{CE6537A1-D6FC-4f65-9D91-7224C49458BB}">
-                  <c15:layout/>
-                  <c15:dlblFieldTable/>
-                  <c15:showDataLabelsRange val="0"/>
                 </c:ext>
               </c:extLst>
             </c:dLbl>
@@ -2278,9 +2265,8 @@
             <c:showPercent val="0"/>
             <c:showBubbleSize val="0"/>
             <c:showLeaderLines val="0"/>
-            <c:extLst xmlns:c16r2="http://schemas.microsoft.com/office/drawing/2015/06/chart">
+            <c:extLst>
               <c:ext xmlns:c15="http://schemas.microsoft.com/office/drawing/2012/chart" uri="{CE6537A1-D6FC-4f65-9D91-7224C49458BB}">
-                <c15:layout/>
                 <c15:showLeaderLines val="0"/>
               </c:ext>
             </c:extLst>
@@ -2326,7 +2312,7 @@
               </c:numCache>
             </c:numRef>
           </c:val>
-          <c:extLst xmlns:c16r2="http://schemas.microsoft.com/office/drawing/2015/06/chart">
+          <c:extLst>
             <c:ext xmlns:c16="http://schemas.microsoft.com/office/drawing/2014/chart" uri="{C3380CC4-5D6E-409C-BE32-E72D297353CC}">
               <c16:uniqueId val="{00000009-56E9-4536-9410-9A28D00DB853}"/>
             </c:ext>
@@ -2365,7 +2351,7 @@
           <c:dPt>
             <c:idx val="0"/>
             <c:bubble3D val="0"/>
-            <c:extLst xmlns:c16r2="http://schemas.microsoft.com/office/drawing/2015/06/chart">
+            <c:extLst>
               <c:ext xmlns:c16="http://schemas.microsoft.com/office/drawing/2014/chart" uri="{C3380CC4-5D6E-409C-BE32-E72D297353CC}">
                 <c16:uniqueId val="{0000000B-56E9-4536-9410-9A28D00DB853}"/>
               </c:ext>
@@ -2374,7 +2360,7 @@
           <c:dPt>
             <c:idx val="1"/>
             <c:bubble3D val="0"/>
-            <c:extLst xmlns:c16r2="http://schemas.microsoft.com/office/drawing/2015/06/chart">
+            <c:extLst>
               <c:ext xmlns:c16="http://schemas.microsoft.com/office/drawing/2014/chart" uri="{C3380CC4-5D6E-409C-BE32-E72D297353CC}">
                 <c16:uniqueId val="{0000000D-56E9-4536-9410-9A28D00DB853}"/>
               </c:ext>
@@ -2383,7 +2369,7 @@
           <c:dPt>
             <c:idx val="2"/>
             <c:bubble3D val="0"/>
-            <c:extLst xmlns:c16r2="http://schemas.microsoft.com/office/drawing/2015/06/chart">
+            <c:extLst>
               <c:ext xmlns:c16="http://schemas.microsoft.com/office/drawing/2014/chart" uri="{C3380CC4-5D6E-409C-BE32-E72D297353CC}">
                 <c16:uniqueId val="{0000000F-56E9-4536-9410-9A28D00DB853}"/>
               </c:ext>
@@ -2438,7 +2424,7 @@
             </c:numRef>
           </c:yVal>
           <c:smooth val="0"/>
-          <c:extLst xmlns:c16r2="http://schemas.microsoft.com/office/drawing/2015/06/chart">
+          <c:extLst>
             <c:ext xmlns:c16="http://schemas.microsoft.com/office/drawing/2014/chart" uri="{C3380CC4-5D6E-409C-BE32-E72D297353CC}">
               <c16:uniqueId val="{00000010-56E9-4536-9410-9A28D00DB853}"/>
             </c:ext>
@@ -6584,7 +6570,7 @@
           <p:nvPr>
             <p:extLst>
               <p:ext uri="{D42A27DB-BD31-4B8C-83A1-F6EECF244321}">
-                <p14:modId xmlns:p14="http://schemas.microsoft.com/office/powerpoint/2010/main" val="1866148914"/>
+                <p14:modId xmlns:p14="http://schemas.microsoft.com/office/powerpoint/2010/main" val="2513401240"/>
               </p:ext>
             </p:extLst>
           </p:nvPr>
@@ -6603,42 +6589,42 @@
                 <a:gridCol w="920552">
                   <a:extLst>
                     <a:ext uri="{9D8B030D-6E8A-4147-A177-3AD203B41FA5}">
-                      <a16:colId xmlns:a16="http://schemas.microsoft.com/office/drawing/2014/main" xmlns="" val="20000"/>
+                      <a16:colId xmlns:a16="http://schemas.microsoft.com/office/drawing/2014/main" val="20000"/>
                     </a:ext>
                   </a:extLst>
                 </a:gridCol>
                 <a:gridCol w="1800200">
                   <a:extLst>
                     <a:ext uri="{9D8B030D-6E8A-4147-A177-3AD203B41FA5}">
-                      <a16:colId xmlns:a16="http://schemas.microsoft.com/office/drawing/2014/main" xmlns="" val="20001"/>
+                      <a16:colId xmlns:a16="http://schemas.microsoft.com/office/drawing/2014/main" val="20001"/>
                     </a:ext>
                   </a:extLst>
                 </a:gridCol>
                 <a:gridCol w="1512168">
                   <a:extLst>
                     <a:ext uri="{9D8B030D-6E8A-4147-A177-3AD203B41FA5}">
-                      <a16:colId xmlns:a16="http://schemas.microsoft.com/office/drawing/2014/main" xmlns="" val="20002"/>
+                      <a16:colId xmlns:a16="http://schemas.microsoft.com/office/drawing/2014/main" val="20002"/>
                     </a:ext>
                   </a:extLst>
                 </a:gridCol>
                 <a:gridCol w="1944216">
                   <a:extLst>
                     <a:ext uri="{9D8B030D-6E8A-4147-A177-3AD203B41FA5}">
-                      <a16:colId xmlns:a16="http://schemas.microsoft.com/office/drawing/2014/main" xmlns="" val="20003"/>
+                      <a16:colId xmlns:a16="http://schemas.microsoft.com/office/drawing/2014/main" val="20003"/>
                     </a:ext>
                   </a:extLst>
                 </a:gridCol>
                 <a:gridCol w="1728192">
                   <a:extLst>
                     <a:ext uri="{9D8B030D-6E8A-4147-A177-3AD203B41FA5}">
-                      <a16:colId xmlns:a16="http://schemas.microsoft.com/office/drawing/2014/main" xmlns="" val="20004"/>
+                      <a16:colId xmlns:a16="http://schemas.microsoft.com/office/drawing/2014/main" val="20004"/>
                     </a:ext>
                   </a:extLst>
                 </a:gridCol>
                 <a:gridCol w="2000672">
                   <a:extLst>
                     <a:ext uri="{9D8B030D-6E8A-4147-A177-3AD203B41FA5}">
-                      <a16:colId xmlns:a16="http://schemas.microsoft.com/office/drawing/2014/main" xmlns="" val="20005"/>
+                      <a16:colId xmlns:a16="http://schemas.microsoft.com/office/drawing/2014/main" val="20005"/>
                     </a:ext>
                   </a:extLst>
                 </a:gridCol>
@@ -6953,7 +6939,7 @@
                 </a:tc>
                 <a:extLst>
                   <a:ext uri="{0D108BD9-81ED-4DB2-BD59-A6C34878D82A}">
-                    <a16:rowId xmlns:a16="http://schemas.microsoft.com/office/drawing/2014/main" xmlns="" val="10000"/>
+                    <a16:rowId xmlns:a16="http://schemas.microsoft.com/office/drawing/2014/main" val="10000"/>
                   </a:ext>
                 </a:extLst>
               </a:tr>
@@ -7013,10 +6999,10 @@
                     <a:p>
                       <a:pPr marL="0" indent="0" algn="ctr">
                         <a:lnSpc>
-                          <a:spcPct val="115000"/>
+                          <a:spcPct val="100000"/>
                         </a:lnSpc>
                         <a:spcBef>
-                          <a:spcPts val="1200"/>
+                          <a:spcPts val="0"/>
                         </a:spcBef>
                         <a:spcAft>
                           <a:spcPts val="0"/>
@@ -7029,7 +7015,29 @@
                           </a:solidFill>
                           <a:effectLst/>
                         </a:rPr>
-                        <a:t>Mitigate avoidable risks</a:t>
+                        <a:t>Mitigate </a:t>
+                      </a:r>
+                    </a:p>
+                    <a:p>
+                      <a:pPr marL="0" indent="0" algn="ctr">
+                        <a:lnSpc>
+                          <a:spcPct val="100000"/>
+                        </a:lnSpc>
+                        <a:spcBef>
+                          <a:spcPts val="0"/>
+                        </a:spcBef>
+                        <a:spcAft>
+                          <a:spcPts val="0"/>
+                        </a:spcAft>
+                      </a:pPr>
+                      <a:r>
+                        <a:rPr lang="en-AU" sz="1400" dirty="0">
+                          <a:solidFill>
+                            <a:schemeClr val="tx1"/>
+                          </a:solidFill>
+                          <a:effectLst/>
+                        </a:rPr>
+                        <a:t>avoidable risks</a:t>
                       </a:r>
                       <a:endParaRPr lang="en-AU" sz="1400" dirty="0">
                         <a:solidFill>
@@ -7070,10 +7078,10 @@
                     <a:p>
                       <a:pPr marL="0" indent="0" algn="ctr">
                         <a:lnSpc>
-                          <a:spcPct val="115000"/>
+                          <a:spcPct val="100000"/>
                         </a:lnSpc>
                         <a:spcBef>
-                          <a:spcPts val="1200"/>
+                          <a:spcPts val="0"/>
                         </a:spcBef>
                         <a:spcAft>
                           <a:spcPts val="0"/>
@@ -7127,10 +7135,10 @@
                     <a:p>
                       <a:pPr marL="0" indent="0" algn="ctr">
                         <a:lnSpc>
-                          <a:spcPct val="115000"/>
+                          <a:spcPct val="100000"/>
                         </a:lnSpc>
                         <a:spcBef>
-                          <a:spcPts val="1200"/>
+                          <a:spcPts val="0"/>
                         </a:spcBef>
                         <a:spcAft>
                           <a:spcPts val="0"/>
@@ -7143,7 +7151,29 @@
                           </a:solidFill>
                           <a:effectLst/>
                         </a:rPr>
-                        <a:t>Measure the remaining risk</a:t>
+                        <a:t>Measure the </a:t>
+                      </a:r>
+                    </a:p>
+                    <a:p>
+                      <a:pPr marL="0" indent="0" algn="ctr">
+                        <a:lnSpc>
+                          <a:spcPct val="100000"/>
+                        </a:lnSpc>
+                        <a:spcBef>
+                          <a:spcPts val="0"/>
+                        </a:spcBef>
+                        <a:spcAft>
+                          <a:spcPts val="0"/>
+                        </a:spcAft>
+                      </a:pPr>
+                      <a:r>
+                        <a:rPr lang="en-AU" sz="1400" dirty="0">
+                          <a:solidFill>
+                            <a:schemeClr val="tx1"/>
+                          </a:solidFill>
+                          <a:effectLst/>
+                        </a:rPr>
+                        <a:t>remaining risk</a:t>
                       </a:r>
                       <a:endParaRPr lang="en-AU" sz="1400" dirty="0">
                         <a:solidFill>
@@ -7184,10 +7214,10 @@
                     <a:p>
                       <a:pPr marL="0" indent="0" algn="ctr">
                         <a:lnSpc>
-                          <a:spcPct val="115000"/>
+                          <a:spcPct val="100000"/>
                         </a:lnSpc>
                         <a:spcBef>
-                          <a:spcPts val="1200"/>
+                          <a:spcPts val="0"/>
                         </a:spcBef>
                         <a:spcAft>
                           <a:spcPts val="0"/>
@@ -7241,10 +7271,10 @@
                     <a:p>
                       <a:pPr marL="0" indent="0" algn="ctr">
                         <a:lnSpc>
-                          <a:spcPct val="115000"/>
+                          <a:spcPct val="100000"/>
                         </a:lnSpc>
                         <a:spcBef>
-                          <a:spcPts val="1200"/>
+                          <a:spcPts val="0"/>
                         </a:spcBef>
                         <a:spcAft>
                           <a:spcPts val="0"/>
@@ -7254,7 +7284,26 @@
                         <a:rPr lang="en-AU" sz="1400" dirty="0">
                           <a:effectLst/>
                         </a:rPr>
-                        <a:t>Manage risk throughout construction</a:t>
+                        <a:t>Manage risk </a:t>
+                      </a:r>
+                    </a:p>
+                    <a:p>
+                      <a:pPr marL="0" indent="0" algn="ctr">
+                        <a:lnSpc>
+                          <a:spcPct val="100000"/>
+                        </a:lnSpc>
+                        <a:spcBef>
+                          <a:spcPts val="0"/>
+                        </a:spcBef>
+                        <a:spcAft>
+                          <a:spcPts val="0"/>
+                        </a:spcAft>
+                      </a:pPr>
+                      <a:r>
+                        <a:rPr lang="en-AU" sz="1400" dirty="0">
+                          <a:effectLst/>
+                        </a:rPr>
+                        <a:t>throughout construction</a:t>
                       </a:r>
                       <a:endParaRPr lang="en-AU" sz="1400" dirty="0">
                         <a:effectLst/>
@@ -7287,7 +7336,7 @@
                 </a:tc>
                 <a:extLst>
                   <a:ext uri="{0D108BD9-81ED-4DB2-BD59-A6C34878D82A}">
-                    <a16:rowId xmlns:a16="http://schemas.microsoft.com/office/drawing/2014/main" xmlns="" val="10001"/>
+                    <a16:rowId xmlns:a16="http://schemas.microsoft.com/office/drawing/2014/main" val="10001"/>
                   </a:ext>
                 </a:extLst>
               </a:tr>
@@ -7525,7 +7574,7 @@
                 </a:tc>
                 <a:extLst>
                   <a:ext uri="{0D108BD9-81ED-4DB2-BD59-A6C34878D82A}">
-                    <a16:rowId xmlns:a16="http://schemas.microsoft.com/office/drawing/2014/main" xmlns="" val="10002"/>
+                    <a16:rowId xmlns:a16="http://schemas.microsoft.com/office/drawing/2014/main" val="10002"/>
                   </a:ext>
                 </a:extLst>
               </a:tr>
@@ -7547,7 +7596,7 @@
                         </a:spcAft>
                       </a:pPr>
                       <a:r>
-                        <a:rPr lang="en-AU" sz="1800" dirty="0" err="1" smtClean="0">
+                        <a:rPr lang="en-AU" sz="1800" dirty="0" err="1">
                           <a:solidFill>
                             <a:schemeClr val="tx1"/>
                           </a:solidFill>
@@ -7650,7 +7699,7 @@
                 </a:tc>
                 <a:extLst>
                   <a:ext uri="{0D108BD9-81ED-4DB2-BD59-A6C34878D82A}">
-                    <a16:rowId xmlns:a16="http://schemas.microsoft.com/office/drawing/2014/main" xmlns="" val="10003"/>
+                    <a16:rowId xmlns:a16="http://schemas.microsoft.com/office/drawing/2014/main" val="10003"/>
                   </a:ext>
                 </a:extLst>
               </a:tr>
@@ -7672,7 +7721,7 @@
                         </a:spcAft>
                       </a:pPr>
                       <a:r>
-                        <a:rPr lang="en-AU" sz="1800" dirty="0" smtClean="0">
+                        <a:rPr lang="en-AU" sz="1800" dirty="0">
                           <a:solidFill>
                             <a:schemeClr val="tx1"/>
                           </a:solidFill>
@@ -7746,7 +7795,7 @@
                 </a:tc>
                 <a:extLst>
                   <a:ext uri="{0D108BD9-81ED-4DB2-BD59-A6C34878D82A}">
-                    <a16:rowId xmlns:a16="http://schemas.microsoft.com/office/drawing/2014/main" xmlns="" val="10004"/>
+                    <a16:rowId xmlns:a16="http://schemas.microsoft.com/office/drawing/2014/main" val="10004"/>
                   </a:ext>
                 </a:extLst>
               </a:tr>
@@ -7768,7 +7817,7 @@
                         </a:spcAft>
                       </a:pPr>
                       <a:r>
-                        <a:rPr lang="en-AU" sz="1800" dirty="0" smtClean="0">
+                        <a:rPr lang="en-AU" sz="1800" dirty="0">
                           <a:solidFill>
                             <a:schemeClr val="tx1"/>
                           </a:solidFill>
@@ -7776,12 +7825,6 @@
                         </a:rPr>
                         <a:t>VIC</a:t>
                       </a:r>
-                      <a:endParaRPr lang="en-AU" sz="1800" dirty="0">
-                        <a:solidFill>
-                          <a:schemeClr val="tx1"/>
-                        </a:solidFill>
-                        <a:effectLst/>
-                      </a:endParaRPr>
                     </a:p>
                     <a:p>
                       <a:pPr marL="540385" algn="ctr">
@@ -7870,7 +7913,7 @@
                 </a:tc>
                 <a:extLst>
                   <a:ext uri="{0D108BD9-81ED-4DB2-BD59-A6C34878D82A}">
-                    <a16:rowId xmlns:a16="http://schemas.microsoft.com/office/drawing/2014/main" xmlns="" val="10005"/>
+                    <a16:rowId xmlns:a16="http://schemas.microsoft.com/office/drawing/2014/main" val="10005"/>
                   </a:ext>
                 </a:extLst>
               </a:tr>
@@ -7966,7 +8009,7 @@
                 </a:tc>
                 <a:extLst>
                   <a:ext uri="{0D108BD9-81ED-4DB2-BD59-A6C34878D82A}">
-                    <a16:rowId xmlns:a16="http://schemas.microsoft.com/office/drawing/2014/main" xmlns="" val="10006"/>
+                    <a16:rowId xmlns:a16="http://schemas.microsoft.com/office/drawing/2014/main" val="10006"/>
                   </a:ext>
                 </a:extLst>
               </a:tr>
@@ -8062,7 +8105,7 @@
                 </a:tc>
                 <a:extLst>
                   <a:ext uri="{0D108BD9-81ED-4DB2-BD59-A6C34878D82A}">
-                    <a16:rowId xmlns:a16="http://schemas.microsoft.com/office/drawing/2014/main" xmlns="" val="10007"/>
+                    <a16:rowId xmlns:a16="http://schemas.microsoft.com/office/drawing/2014/main" val="10007"/>
                   </a:ext>
                 </a:extLst>
               </a:tr>
@@ -8084,7 +8127,7 @@
                         </a:spcAft>
                       </a:pPr>
                       <a:r>
-                        <a:rPr lang="en-AU" sz="1800" dirty="0" smtClean="0">
+                        <a:rPr lang="en-AU" sz="1800" dirty="0">
                           <a:solidFill>
                             <a:schemeClr val="tx1"/>
                           </a:solidFill>
@@ -8167,7 +8210,7 @@
                 </a:tc>
                 <a:extLst>
                   <a:ext uri="{0D108BD9-81ED-4DB2-BD59-A6C34878D82A}">
-                    <a16:rowId xmlns:a16="http://schemas.microsoft.com/office/drawing/2014/main" xmlns="" val="10008"/>
+                    <a16:rowId xmlns:a16="http://schemas.microsoft.com/office/drawing/2014/main" val="10008"/>
                   </a:ext>
                 </a:extLst>
               </a:tr>
@@ -8680,35 +8723,35 @@
                 <a:gridCol w="1584176">
                   <a:extLst>
                     <a:ext uri="{9D8B030D-6E8A-4147-A177-3AD203B41FA5}">
-                      <a16:colId xmlns:a16="http://schemas.microsoft.com/office/drawing/2014/main" xmlns="" val="20000"/>
+                      <a16:colId xmlns:a16="http://schemas.microsoft.com/office/drawing/2014/main" val="20000"/>
                     </a:ext>
                   </a:extLst>
                 </a:gridCol>
                 <a:gridCol w="1890881">
                   <a:extLst>
                     <a:ext uri="{9D8B030D-6E8A-4147-A177-3AD203B41FA5}">
-                      <a16:colId xmlns:a16="http://schemas.microsoft.com/office/drawing/2014/main" xmlns="" val="20001"/>
+                      <a16:colId xmlns:a16="http://schemas.microsoft.com/office/drawing/2014/main" val="20001"/>
                     </a:ext>
                   </a:extLst>
                 </a:gridCol>
                 <a:gridCol w="1937289">
                   <a:extLst>
                     <a:ext uri="{9D8B030D-6E8A-4147-A177-3AD203B41FA5}">
-                      <a16:colId xmlns:a16="http://schemas.microsoft.com/office/drawing/2014/main" xmlns="" val="20002"/>
+                      <a16:colId xmlns:a16="http://schemas.microsoft.com/office/drawing/2014/main" val="20002"/>
                     </a:ext>
                   </a:extLst>
                 </a:gridCol>
                 <a:gridCol w="1937289">
                   <a:extLst>
                     <a:ext uri="{9D8B030D-6E8A-4147-A177-3AD203B41FA5}">
-                      <a16:colId xmlns:a16="http://schemas.microsoft.com/office/drawing/2014/main" xmlns="" val="20003"/>
+                      <a16:colId xmlns:a16="http://schemas.microsoft.com/office/drawing/2014/main" val="20003"/>
                     </a:ext>
                   </a:extLst>
                 </a:gridCol>
                 <a:gridCol w="2571918">
                   <a:extLst>
                     <a:ext uri="{9D8B030D-6E8A-4147-A177-3AD203B41FA5}">
-                      <a16:colId xmlns:a16="http://schemas.microsoft.com/office/drawing/2014/main" xmlns="" val="20004"/>
+                      <a16:colId xmlns:a16="http://schemas.microsoft.com/office/drawing/2014/main" val="20004"/>
                     </a:ext>
                   </a:extLst>
                 </a:gridCol>
@@ -8961,7 +9004,7 @@
                 </a:tc>
                 <a:extLst>
                   <a:ext uri="{0D108BD9-81ED-4DB2-BD59-A6C34878D82A}">
-                    <a16:rowId xmlns:a16="http://schemas.microsoft.com/office/drawing/2014/main" xmlns="" val="10000"/>
+                    <a16:rowId xmlns:a16="http://schemas.microsoft.com/office/drawing/2014/main" val="10000"/>
                   </a:ext>
                 </a:extLst>
               </a:tr>
@@ -9315,7 +9358,7 @@
                 </a:tc>
                 <a:extLst>
                   <a:ext uri="{0D108BD9-81ED-4DB2-BD59-A6C34878D82A}">
-                    <a16:rowId xmlns:a16="http://schemas.microsoft.com/office/drawing/2014/main" xmlns="" val="10001"/>
+                    <a16:rowId xmlns:a16="http://schemas.microsoft.com/office/drawing/2014/main" val="10001"/>
                   </a:ext>
                 </a:extLst>
               </a:tr>
@@ -9609,7 +9652,7 @@
                 </a:tc>
                 <a:extLst>
                   <a:ext uri="{0D108BD9-81ED-4DB2-BD59-A6C34878D82A}">
-                    <a16:rowId xmlns:a16="http://schemas.microsoft.com/office/drawing/2014/main" xmlns="" val="10002"/>
+                    <a16:rowId xmlns:a16="http://schemas.microsoft.com/office/drawing/2014/main" val="10002"/>
                   </a:ext>
                 </a:extLst>
               </a:tr>
@@ -9963,7 +10006,7 @@
                 </a:tc>
                 <a:extLst>
                   <a:ext uri="{0D108BD9-81ED-4DB2-BD59-A6C34878D82A}">
-                    <a16:rowId xmlns:a16="http://schemas.microsoft.com/office/drawing/2014/main" xmlns="" val="10003"/>
+                    <a16:rowId xmlns:a16="http://schemas.microsoft.com/office/drawing/2014/main" val="10003"/>
                   </a:ext>
                 </a:extLst>
               </a:tr>
@@ -10317,7 +10360,7 @@
                 </a:tc>
                 <a:extLst>
                   <a:ext uri="{0D108BD9-81ED-4DB2-BD59-A6C34878D82A}">
-                    <a16:rowId xmlns:a16="http://schemas.microsoft.com/office/drawing/2014/main" xmlns="" val="10004"/>
+                    <a16:rowId xmlns:a16="http://schemas.microsoft.com/office/drawing/2014/main" val="10004"/>
                   </a:ext>
                 </a:extLst>
               </a:tr>
@@ -10671,7 +10714,7 @@
                 </a:tc>
                 <a:extLst>
                   <a:ext uri="{0D108BD9-81ED-4DB2-BD59-A6C34878D82A}">
-                    <a16:rowId xmlns:a16="http://schemas.microsoft.com/office/drawing/2014/main" xmlns="" val="10005"/>
+                    <a16:rowId xmlns:a16="http://schemas.microsoft.com/office/drawing/2014/main" val="10005"/>
                   </a:ext>
                 </a:extLst>
               </a:tr>
@@ -11025,7 +11068,7 @@
                 </a:tc>
                 <a:extLst>
                   <a:ext uri="{0D108BD9-81ED-4DB2-BD59-A6C34878D82A}">
-                    <a16:rowId xmlns:a16="http://schemas.microsoft.com/office/drawing/2014/main" xmlns="" val="10006"/>
+                    <a16:rowId xmlns:a16="http://schemas.microsoft.com/office/drawing/2014/main" val="10006"/>
                   </a:ext>
                 </a:extLst>
               </a:tr>
@@ -11379,7 +11422,7 @@
                 </a:tc>
                 <a:extLst>
                   <a:ext uri="{0D108BD9-81ED-4DB2-BD59-A6C34878D82A}">
-                    <a16:rowId xmlns:a16="http://schemas.microsoft.com/office/drawing/2014/main" xmlns="" val="10007"/>
+                    <a16:rowId xmlns:a16="http://schemas.microsoft.com/office/drawing/2014/main" val="10007"/>
                   </a:ext>
                 </a:extLst>
               </a:tr>

</xml_diff>